<commit_message>
added new milestones and my role to ppt
</commit_message>
<xml_diff>
--- a/Team Project Analysis-Milestone 2.pptx
+++ b/Team Project Analysis-Milestone 2.pptx
@@ -4759,7 +4759,7 @@
           <a:p>
             <a:r>
               <a:rPr lang="en-US" sz="2400" dirty="0"/>
-              <a:t>Brendan Madigan -</a:t>
+              <a:t>Brendan Madigan – Developer: tool research and testing</a:t>
             </a:r>
           </a:p>
           <a:p>
@@ -5066,7 +5066,7 @@
           <a:lstStyle/>
           <a:p>
             <a:r>
-              <a:rPr lang="en-US" sz="2400">
+              <a:rPr lang="en-US" sz="2400" dirty="0">
                 <a:solidFill>
                   <a:srgbClr val="000000"/>
                 </a:solidFill>
@@ -5074,7 +5074,7 @@
               <a:t>Each member of the team has access to the </a:t>
             </a:r>
             <a:r>
-              <a:rPr lang="en-US" sz="2400" err="1">
+              <a:rPr lang="en-US" sz="2400" dirty="0" err="1">
                 <a:solidFill>
                   <a:srgbClr val="000000"/>
                 </a:solidFill>
@@ -5082,7 +5082,7 @@
               <a:t>Github</a:t>
             </a:r>
             <a:r>
-              <a:rPr lang="en-US" sz="2400">
+              <a:rPr lang="en-US" sz="2400" dirty="0">
                 <a:solidFill>
                   <a:srgbClr val="000000"/>
                 </a:solidFill>
@@ -5092,7 +5092,7 @@
           </a:p>
           <a:p>
             <a:r>
-              <a:rPr lang="en-US" sz="2400">
+              <a:rPr lang="en-US" sz="2400" dirty="0">
                 <a:solidFill>
                   <a:srgbClr val="000000"/>
                 </a:solidFill>
@@ -5100,7 +5100,7 @@
               <a:t>The team will use Microsoft Visual Studio to code and implement the </a:t>
             </a:r>
             <a:r>
-              <a:rPr lang="en-US" sz="2400" err="1">
+              <a:rPr lang="en-US" sz="2400" dirty="0" err="1">
                 <a:solidFill>
                   <a:srgbClr val="000000"/>
                 </a:solidFill>
@@ -5108,7 +5108,7 @@
               <a:t>Pyaudio</a:t>
             </a:r>
             <a:r>
-              <a:rPr lang="en-US" sz="2400">
+              <a:rPr lang="en-US" sz="2400" dirty="0">
                 <a:solidFill>
                   <a:srgbClr val="000000"/>
                 </a:solidFill>
@@ -5118,12 +5118,28 @@
           </a:p>
           <a:p>
             <a:r>
-              <a:rPr lang="en-US" sz="2400">
+              <a:rPr lang="en-US" sz="2400" dirty="0">
                 <a:solidFill>
                   <a:srgbClr val="000000"/>
                 </a:solidFill>
               </a:rPr>
-              <a:t>Problem solving is done by each member with group meetings to help solve larger issues</a:t>
+              <a:t>For the GUI we are using the </a:t>
+            </a:r>
+            <a:r>
+              <a:rPr lang="en-US" sz="2400" dirty="0" err="1">
+                <a:solidFill>
+                  <a:srgbClr val="000000"/>
+                </a:solidFill>
+              </a:rPr>
+              <a:t>Tkinter</a:t>
+            </a:r>
+            <a:r>
+              <a:rPr lang="en-US" sz="2400" dirty="0">
+                <a:solidFill>
+                  <a:srgbClr val="000000"/>
+                </a:solidFill>
+              </a:rPr>
+              <a:t> library</a:t>
             </a:r>
           </a:p>
         </p:txBody>
@@ -5606,7 +5622,7 @@
                   <a:srgbClr val="FEFFFF"/>
                 </a:solidFill>
               </a:rPr>
-              <a:t>Milestone 2 hopes to include a recording button on our application</a:t>
+              <a:t>Milestone 3 hopes to be able to change the name and directory of WAV files.</a:t>
             </a:r>
           </a:p>
           <a:p>
@@ -5616,7 +5632,7 @@
                   <a:srgbClr val="FEFFFF"/>
                 </a:solidFill>
               </a:rPr>
-              <a:t>Milestone 3 hopes to have the sound waves visible in the application</a:t>
+              <a:t>Milestone 4 hopes to be able to visualize the WAV file.</a:t>
             </a:r>
           </a:p>
           <a:p>
@@ -6381,7 +6397,7 @@
                   <a:srgbClr val="FFFFFF"/>
                 </a:solidFill>
               </a:rPr>
-              <a:t>Hunter Hutchison is the Maintainer, while the other three are developers</a:t>
+              <a:t>Hunter Hutchison is the Maintainer, while the other four are developers</a:t>
             </a:r>
             <a:endParaRPr lang="en-US" sz="2200" dirty="0">
               <a:solidFill>
@@ -7188,21 +7204,6 @@
 </file>
 
 <file path=customXml/item1.xml><?xml version="1.0" encoding="utf-8"?>
-<?mso-contentType ?>
-<FormTemplates xmlns="http://schemas.microsoft.com/sharepoint/v3/contenttype/forms">
-  <Display>DocumentLibraryForm</Display>
-  <Edit>DocumentLibraryForm</Edit>
-  <New>DocumentLibraryForm</New>
-</FormTemplates>
-</file>
-
-<file path=customXml/item2.xml><?xml version="1.0" encoding="utf-8"?>
-<p:properties xmlns:p="http://schemas.microsoft.com/office/2006/metadata/properties" xmlns:xsi="http://www.w3.org/2001/XMLSchema-instance" xmlns:pc="http://schemas.microsoft.com/office/infopath/2007/PartnerControls">
-  <documentManagement/>
-</p:properties>
-</file>
-
-<file path=customXml/item3.xml><?xml version="1.0" encoding="utf-8"?>
 <ct:contentTypeSchema xmlns:ct="http://schemas.microsoft.com/office/2006/metadata/contentType" xmlns:ma="http://schemas.microsoft.com/office/2006/metadata/properties/metaAttributes" ct:_="" ma:_="" ma:contentTypeName="Document" ma:contentTypeID="0x010100B83F15C4FCF804478E3BADB576B4C299" ma:contentTypeVersion="7" ma:contentTypeDescription="Create a new document." ma:contentTypeScope="" ma:versionID="930809e748fc6959764d7869ec4e365f">
   <xsd:schema xmlns:xsd="http://www.w3.org/2001/XMLSchema" xmlns:xs="http://www.w3.org/2001/XMLSchema" xmlns:p="http://schemas.microsoft.com/office/2006/metadata/properties" xmlns:ns2="b2e1892c-5437-4137-8a88-42b80d9b5f89" targetNamespace="http://schemas.microsoft.com/office/2006/metadata/properties" ma:root="true" ma:fieldsID="3dd37e49cfc568f44505b9e5ce2458fd" ns2:_="">
     <xsd:import namespace="b2e1892c-5437-4137-8a88-42b80d9b5f89"/>
@@ -7366,24 +7367,22 @@
 </ct:contentTypeSchema>
 </file>
 
-<file path=customXml/itemProps1.xml><?xml version="1.0" encoding="utf-8"?>
-<ds:datastoreItem xmlns:ds="http://schemas.openxmlformats.org/officeDocument/2006/customXml" ds:itemID="{93917266-76AC-43BC-9612-B6F4F0D9ACF1}">
-  <ds:schemaRefs>
-    <ds:schemaRef ds:uri="http://schemas.microsoft.com/sharepoint/v3/contenttype/forms"/>
-  </ds:schemaRefs>
-</ds:datastoreItem>
+<file path=customXml/item2.xml><?xml version="1.0" encoding="utf-8"?>
+<p:properties xmlns:p="http://schemas.microsoft.com/office/2006/metadata/properties" xmlns:xsi="http://www.w3.org/2001/XMLSchema-instance" xmlns:pc="http://schemas.microsoft.com/office/infopath/2007/PartnerControls">
+  <documentManagement/>
+</p:properties>
 </file>
 
-<file path=customXml/itemProps2.xml><?xml version="1.0" encoding="utf-8"?>
-<ds:datastoreItem xmlns:ds="http://schemas.openxmlformats.org/officeDocument/2006/customXml" ds:itemID="{DD1865A7-261E-425C-9584-952C374402C9}">
-  <ds:schemaRefs>
-    <ds:schemaRef ds:uri="http://schemas.microsoft.com/office/2006/metadata/properties"/>
-    <ds:schemaRef ds:uri="http://schemas.microsoft.com/office/infopath/2007/PartnerControls"/>
-  </ds:schemaRefs>
-</ds:datastoreItem>
+<file path=customXml/item3.xml><?xml version="1.0" encoding="utf-8"?>
+<?mso-contentType ?>
+<FormTemplates xmlns="http://schemas.microsoft.com/sharepoint/v3/contenttype/forms">
+  <Display>DocumentLibraryForm</Display>
+  <Edit>DocumentLibraryForm</Edit>
+  <New>DocumentLibraryForm</New>
+</FormTemplates>
 </file>
 
-<file path=customXml/itemProps3.xml><?xml version="1.0" encoding="utf-8"?>
+<file path=customXml/itemProps1.xml><?xml version="1.0" encoding="utf-8"?>
 <ds:datastoreItem xmlns:ds="http://schemas.openxmlformats.org/officeDocument/2006/customXml" ds:itemID="{7F35A223-83C7-4479-AFDF-5E0E4EA75548}">
   <ds:schemaRefs>
     <ds:schemaRef ds:uri="b2e1892c-5437-4137-8a88-42b80d9b5f89"/>
@@ -7399,4 +7398,21 @@
     <ds:schemaRef ds:uri="http://www.w3.org/2001/XMLSchema"/>
   </ds:schemaRefs>
 </ds:datastoreItem>
+</file>
+
+<file path=customXml/itemProps2.xml><?xml version="1.0" encoding="utf-8"?>
+<ds:datastoreItem xmlns:ds="http://schemas.openxmlformats.org/officeDocument/2006/customXml" ds:itemID="{DD1865A7-261E-425C-9584-952C374402C9}">
+  <ds:schemaRefs>
+    <ds:schemaRef ds:uri="http://schemas.microsoft.com/office/2006/metadata/properties"/>
+    <ds:schemaRef ds:uri="http://schemas.microsoft.com/office/infopath/2007/PartnerControls"/>
+  </ds:schemaRefs>
+</ds:datastoreItem>
+</file>
+
+<file path=customXml/itemProps3.xml><?xml version="1.0" encoding="utf-8"?>
+<ds:datastoreItem xmlns:ds="http://schemas.openxmlformats.org/officeDocument/2006/customXml" ds:itemID="{93917266-76AC-43BC-9612-B6F4F0D9ACF1}">
+  <ds:schemaRefs>
+    <ds:schemaRef ds:uri="http://schemas.microsoft.com/sharepoint/v3/contenttype/forms"/>
+  </ds:schemaRefs>
+</ds:datastoreItem>
 </file>
</xml_diff>